<commit_message>
Updated the Movie ticket booking system.pptx
</commit_message>
<xml_diff>
--- a/documents/Movie ticket booking system.pptx
+++ b/documents/Movie ticket booking system.pptx
@@ -4428,7 +4428,15 @@
             <a:pPr lvl="0"/>
             <a:r>
               <a:rPr lang="en-GB" dirty="0"/>
-              <a:t>Complex payment integration</a:t>
+              <a:t>Complex </a:t>
+            </a:r>
+            <a:r>
+              <a:rPr lang="en-GB"/>
+              <a:t>payment </a:t>
+            </a:r>
+            <a:r>
+              <a:rPr lang="en-GB" smtClean="0"/>
+              <a:t>integration</a:t>
             </a:r>
             <a:endParaRPr lang="en-US" dirty="0"/>
           </a:p>

</xml_diff>